<commit_message>
updated security analysis for app platform
</commit_message>
<xml_diff>
--- a/docs/specs/runtime/securityanalysis_figs.pptx
+++ b/docs/specs/runtime/securityanalysis_figs.pptx
@@ -13,6 +13,8 @@
     <p:sldId id="257" r:id="rId7"/>
     <p:sldId id="259" r:id="rId8"/>
     <p:sldId id="262" r:id="rId9"/>
+    <p:sldId id="265" r:id="rId10"/>
+    <p:sldId id="266" r:id="rId11"/>
   </p:sldIdLst>
   <p:sldSz cx="9144000" cy="6858000" type="screen4x3"/>
   <p:notesSz cx="6858000" cy="9144000"/>
@@ -295,7 +297,7 @@
           <a:p>
             <a:fld id="{07B27951-8294-EF40-9558-AC697FB84744}" type="datetimeFigureOut">
               <a:rPr lang="en-US" smtClean="0"/>
-              <a:t>02/07/15</a:t>
+              <a:t>16/07/15</a:t>
             </a:fld>
             <a:endParaRPr lang="en-US"/>
           </a:p>
@@ -465,7 +467,7 @@
           <a:p>
             <a:fld id="{07B27951-8294-EF40-9558-AC697FB84744}" type="datetimeFigureOut">
               <a:rPr lang="en-US" smtClean="0"/>
-              <a:t>02/07/15</a:t>
+              <a:t>16/07/15</a:t>
             </a:fld>
             <a:endParaRPr lang="en-US"/>
           </a:p>
@@ -645,7 +647,7 @@
           <a:p>
             <a:fld id="{07B27951-8294-EF40-9558-AC697FB84744}" type="datetimeFigureOut">
               <a:rPr lang="en-US" smtClean="0"/>
-              <a:t>02/07/15</a:t>
+              <a:t>16/07/15</a:t>
             </a:fld>
             <a:endParaRPr lang="en-US"/>
           </a:p>
@@ -815,7 +817,7 @@
           <a:p>
             <a:fld id="{07B27951-8294-EF40-9558-AC697FB84744}" type="datetimeFigureOut">
               <a:rPr lang="en-US" smtClean="0"/>
-              <a:t>02/07/15</a:t>
+              <a:t>16/07/15</a:t>
             </a:fld>
             <a:endParaRPr lang="en-US"/>
           </a:p>
@@ -1061,7 +1063,7 @@
           <a:p>
             <a:fld id="{07B27951-8294-EF40-9558-AC697FB84744}" type="datetimeFigureOut">
               <a:rPr lang="en-US" smtClean="0"/>
-              <a:t>02/07/15</a:t>
+              <a:t>16/07/15</a:t>
             </a:fld>
             <a:endParaRPr lang="en-US"/>
           </a:p>
@@ -1349,7 +1351,7 @@
           <a:p>
             <a:fld id="{07B27951-8294-EF40-9558-AC697FB84744}" type="datetimeFigureOut">
               <a:rPr lang="en-US" smtClean="0"/>
-              <a:t>02/07/15</a:t>
+              <a:t>16/07/15</a:t>
             </a:fld>
             <a:endParaRPr lang="en-US"/>
           </a:p>
@@ -1771,7 +1773,7 @@
           <a:p>
             <a:fld id="{07B27951-8294-EF40-9558-AC697FB84744}" type="datetimeFigureOut">
               <a:rPr lang="en-US" smtClean="0"/>
-              <a:t>02/07/15</a:t>
+              <a:t>16/07/15</a:t>
             </a:fld>
             <a:endParaRPr lang="en-US"/>
           </a:p>
@@ -1889,7 +1891,7 @@
           <a:p>
             <a:fld id="{07B27951-8294-EF40-9558-AC697FB84744}" type="datetimeFigureOut">
               <a:rPr lang="en-US" smtClean="0"/>
-              <a:t>02/07/15</a:t>
+              <a:t>16/07/15</a:t>
             </a:fld>
             <a:endParaRPr lang="en-US"/>
           </a:p>
@@ -1984,7 +1986,7 @@
           <a:p>
             <a:fld id="{07B27951-8294-EF40-9558-AC697FB84744}" type="datetimeFigureOut">
               <a:rPr lang="en-US" smtClean="0"/>
-              <a:t>02/07/15</a:t>
+              <a:t>16/07/15</a:t>
             </a:fld>
             <a:endParaRPr lang="en-US"/>
           </a:p>
@@ -2261,7 +2263,7 @@
           <a:p>
             <a:fld id="{07B27951-8294-EF40-9558-AC697FB84744}" type="datetimeFigureOut">
               <a:rPr lang="en-US" smtClean="0"/>
-              <a:t>02/07/15</a:t>
+              <a:t>16/07/15</a:t>
             </a:fld>
             <a:endParaRPr lang="en-US"/>
           </a:p>
@@ -2514,7 +2516,7 @@
           <a:p>
             <a:fld id="{07B27951-8294-EF40-9558-AC697FB84744}" type="datetimeFigureOut">
               <a:rPr lang="en-US" smtClean="0"/>
-              <a:t>02/07/15</a:t>
+              <a:t>16/07/15</a:t>
             </a:fld>
             <a:endParaRPr lang="en-US"/>
           </a:p>
@@ -2727,7 +2729,7 @@
           <a:p>
             <a:fld id="{07B27951-8294-EF40-9558-AC697FB84744}" type="datetimeFigureOut">
               <a:rPr lang="en-US" smtClean="0"/>
-              <a:t>02/07/15</a:t>
+              <a:t>16/07/15</a:t>
             </a:fld>
             <a:endParaRPr lang="en-US"/>
           </a:p>
@@ -3115,6 +3117,1238 @@
 </p:sld>
 </file>
 
+<file path=ppt/slides/slide10.xml><?xml version="1.0" encoding="utf-8"?>
+<p:sld xmlns:a="http://schemas.openxmlformats.org/drawingml/2006/main" xmlns:r="http://schemas.openxmlformats.org/officeDocument/2006/relationships" xmlns:p="http://schemas.openxmlformats.org/presentationml/2006/main">
+  <p:cSld>
+    <p:spTree>
+      <p:nvGrpSpPr>
+        <p:cNvPr id="1" name=""/>
+        <p:cNvGrpSpPr/>
+        <p:nvPr/>
+      </p:nvGrpSpPr>
+      <p:grpSpPr>
+        <a:xfrm>
+          <a:off x="0" y="0"/>
+          <a:ext cx="0" cy="0"/>
+          <a:chOff x="0" y="0"/>
+          <a:chExt cx="0" cy="0"/>
+        </a:xfrm>
+      </p:grpSpPr>
+      <p:graphicFrame>
+        <p:nvGraphicFramePr>
+          <p:cNvPr id="4" name="Table 3"/>
+          <p:cNvGraphicFramePr>
+            <a:graphicFrameLocks noGrp="1"/>
+          </p:cNvGraphicFramePr>
+          <p:nvPr>
+            <p:extLst>
+              <p:ext uri="{D42A27DB-BD31-4B8C-83A1-F6EECF244321}">
+                <p14:modId xmlns:p14="http://schemas.microsoft.com/office/powerpoint/2010/main" val="431987755"/>
+              </p:ext>
+            </p:extLst>
+          </p:nvPr>
+        </p:nvGraphicFramePr>
+        <p:xfrm>
+          <a:off x="2127584" y="1397000"/>
+          <a:ext cx="5492415" cy="2372359"/>
+        </p:xfrm>
+        <a:graphic>
+          <a:graphicData uri="http://schemas.openxmlformats.org/drawingml/2006/table">
+            <a:tbl>
+              <a:tblPr firstRow="1" firstCol="1" lastCol="1" bandRow="1">
+                <a:tableStyleId>{5940675A-B579-460E-94D1-54222C63F5DA}</a:tableStyleId>
+              </a:tblPr>
+              <a:tblGrid>
+                <a:gridCol w="1107213"/>
+                <a:gridCol w="1497993"/>
+                <a:gridCol w="1465428"/>
+                <a:gridCol w="1421781"/>
+              </a:tblGrid>
+              <a:tr h="370840">
+                <a:tc>
+                  <a:txBody>
+                    <a:bodyPr/>
+                    <a:lstStyle/>
+                    <a:p>
+                      <a:r>
+                        <a:rPr lang="en-US" sz="1400" b="1" dirty="0" smtClean="0">
+                          <a:solidFill>
+                            <a:schemeClr val="tx1"/>
+                          </a:solidFill>
+                        </a:rPr>
+                        <a:t>Application</a:t>
+                      </a:r>
+                    </a:p>
+                    <a:p>
+                      <a:r>
+                        <a:rPr lang="en-US" sz="1400" b="1" dirty="0" smtClean="0">
+                          <a:solidFill>
+                            <a:schemeClr val="tx1"/>
+                          </a:solidFill>
+                        </a:rPr>
+                        <a:t>Platform</a:t>
+                      </a:r>
+                      <a:endParaRPr lang="en-US" sz="1400" b="1" dirty="0">
+                        <a:solidFill>
+                          <a:schemeClr val="tx1"/>
+                        </a:solidFill>
+                      </a:endParaRPr>
+                    </a:p>
+                  </a:txBody>
+                  <a:tcPr>
+                    <a:lnL w="12700" cap="flat" cmpd="sng" algn="ctr">
+                      <a:solidFill>
+                        <a:scrgbClr r="0" g="0" b="0"/>
+                      </a:solidFill>
+                      <a:prstDash val="solid"/>
+                      <a:round/>
+                      <a:headEnd type="none" w="med" len="med"/>
+                      <a:tailEnd type="none" w="med" len="med"/>
+                    </a:lnL>
+                    <a:lnT w="12700" cap="flat" cmpd="sng" algn="ctr">
+                      <a:solidFill>
+                        <a:scrgbClr r="0" g="0" b="0"/>
+                      </a:solidFill>
+                      <a:prstDash val="solid"/>
+                      <a:round/>
+                      <a:headEnd type="none" w="med" len="med"/>
+                      <a:tailEnd type="none" w="med" len="med"/>
+                    </a:lnT>
+                  </a:tcPr>
+                </a:tc>
+                <a:tc>
+                  <a:txBody>
+                    <a:bodyPr/>
+                    <a:lstStyle/>
+                    <a:p>
+                      <a:pPr algn="ctr"/>
+                      <a:r>
+                        <a:rPr lang="en-US" sz="1400" b="1" dirty="0" smtClean="0">
+                          <a:solidFill>
+                            <a:schemeClr val="tx1"/>
+                          </a:solidFill>
+                        </a:rPr>
+                        <a:t>D1</a:t>
+                      </a:r>
+                      <a:endParaRPr lang="en-US" sz="1400" b="1" dirty="0">
+                        <a:solidFill>
+                          <a:schemeClr val="tx1"/>
+                        </a:solidFill>
+                      </a:endParaRPr>
+                    </a:p>
+                  </a:txBody>
+                  <a:tcPr>
+                    <a:lnT w="12700" cap="flat" cmpd="sng" algn="ctr">
+                      <a:solidFill>
+                        <a:scrgbClr r="0" g="0" b="0"/>
+                      </a:solidFill>
+                      <a:prstDash val="solid"/>
+                      <a:round/>
+                      <a:headEnd type="none" w="med" len="med"/>
+                      <a:tailEnd type="none" w="med" len="med"/>
+                    </a:lnT>
+                  </a:tcPr>
+                </a:tc>
+                <a:tc>
+                  <a:txBody>
+                    <a:bodyPr/>
+                    <a:lstStyle/>
+                    <a:p>
+                      <a:pPr algn="ctr"/>
+                      <a:r>
+                        <a:rPr lang="en-US" sz="1400" b="1" dirty="0" smtClean="0">
+                          <a:solidFill>
+                            <a:schemeClr val="tx1"/>
+                          </a:solidFill>
+                        </a:rPr>
+                        <a:t>D2</a:t>
+                      </a:r>
+                      <a:endParaRPr lang="en-US" sz="1400" b="1" dirty="0">
+                        <a:solidFill>
+                          <a:schemeClr val="tx1"/>
+                        </a:solidFill>
+                      </a:endParaRPr>
+                    </a:p>
+                  </a:txBody>
+                  <a:tcPr>
+                    <a:lnT w="12700" cap="flat" cmpd="sng" algn="ctr">
+                      <a:solidFill>
+                        <a:scrgbClr r="0" g="0" b="0"/>
+                      </a:solidFill>
+                      <a:prstDash val="solid"/>
+                      <a:round/>
+                      <a:headEnd type="none" w="med" len="med"/>
+                      <a:tailEnd type="none" w="med" len="med"/>
+                    </a:lnT>
+                  </a:tcPr>
+                </a:tc>
+                <a:tc>
+                  <a:txBody>
+                    <a:bodyPr/>
+                    <a:lstStyle/>
+                    <a:p>
+                      <a:pPr algn="ctr"/>
+                      <a:r>
+                        <a:rPr lang="en-US" sz="1400" b="1" dirty="0" smtClean="0">
+                          <a:solidFill>
+                            <a:schemeClr val="tx1"/>
+                          </a:solidFill>
+                        </a:rPr>
+                        <a:t>D3</a:t>
+                      </a:r>
+                      <a:endParaRPr lang="en-US" sz="1400" b="1" dirty="0">
+                        <a:solidFill>
+                          <a:schemeClr val="tx1"/>
+                        </a:solidFill>
+                      </a:endParaRPr>
+                    </a:p>
+                  </a:txBody>
+                  <a:tcPr>
+                    <a:lnR w="12700" cap="flat" cmpd="sng" algn="ctr">
+                      <a:solidFill>
+                        <a:scrgbClr r="0" g="0" b="0"/>
+                      </a:solidFill>
+                      <a:prstDash val="solid"/>
+                      <a:round/>
+                      <a:headEnd type="none" w="med" len="med"/>
+                      <a:tailEnd type="none" w="med" len="med"/>
+                    </a:lnR>
+                    <a:lnT w="12700" cap="flat" cmpd="sng" algn="ctr">
+                      <a:solidFill>
+                        <a:scrgbClr r="0" g="0" b="0"/>
+                      </a:solidFill>
+                      <a:prstDash val="solid"/>
+                      <a:round/>
+                      <a:headEnd type="none" w="med" len="med"/>
+                      <a:tailEnd type="none" w="med" len="med"/>
+                    </a:lnT>
+                  </a:tcPr>
+                </a:tc>
+              </a:tr>
+              <a:tr h="370840">
+                <a:tc>
+                  <a:txBody>
+                    <a:bodyPr/>
+                    <a:lstStyle/>
+                    <a:p>
+                      <a:r>
+                        <a:rPr lang="en-US" sz="1400" b="1" dirty="0" smtClean="0">
+                          <a:solidFill>
+                            <a:schemeClr val="tx1"/>
+                          </a:solidFill>
+                        </a:rPr>
+                        <a:t>V1</a:t>
+                      </a:r>
+                      <a:endParaRPr lang="en-US" sz="1400" b="1" dirty="0">
+                        <a:solidFill>
+                          <a:schemeClr val="tx1"/>
+                        </a:solidFill>
+                      </a:endParaRPr>
+                    </a:p>
+                  </a:txBody>
+                  <a:tcPr>
+                    <a:lnL w="12700" cap="flat" cmpd="sng" algn="ctr">
+                      <a:solidFill>
+                        <a:scrgbClr r="0" g="0" b="0"/>
+                      </a:solidFill>
+                      <a:prstDash val="solid"/>
+                      <a:round/>
+                      <a:headEnd type="none" w="med" len="med"/>
+                      <a:tailEnd type="none" w="med" len="med"/>
+                    </a:lnL>
+                  </a:tcPr>
+                </a:tc>
+                <a:tc>
+                  <a:txBody>
+                    <a:bodyPr/>
+                    <a:lstStyle/>
+                    <a:p>
+                      <a:pPr algn="ctr"/>
+                      <a:r>
+                        <a:rPr lang="en-US" sz="1400" baseline="0" dirty="0" smtClean="0">
+                          <a:solidFill>
+                            <a:schemeClr val="tx1"/>
+                          </a:solidFill>
+                        </a:rPr>
+                        <a:t>-</a:t>
+                      </a:r>
+                      <a:endParaRPr lang="en-US" sz="1400" baseline="-25000" dirty="0">
+                        <a:solidFill>
+                          <a:schemeClr val="tx1"/>
+                        </a:solidFill>
+                      </a:endParaRPr>
+                    </a:p>
+                  </a:txBody>
+                  <a:tcPr/>
+                </a:tc>
+                <a:tc>
+                  <a:txBody>
+                    <a:bodyPr/>
+                    <a:lstStyle/>
+                    <a:p>
+                      <a:pPr marL="0" marR="0" indent="0" algn="ctr" defTabSz="457200" rtl="0" eaLnBrk="1" fontAlgn="auto" latinLnBrk="0" hangingPunct="1">
+                        <a:lnSpc>
+                          <a:spcPct val="100000"/>
+                        </a:lnSpc>
+                        <a:spcBef>
+                          <a:spcPts val="0"/>
+                        </a:spcBef>
+                        <a:spcAft>
+                          <a:spcPts val="0"/>
+                        </a:spcAft>
+                        <a:buClrTx/>
+                        <a:buSzTx/>
+                        <a:buFontTx/>
+                        <a:buNone/>
+                        <a:tabLst/>
+                        <a:defRPr/>
+                      </a:pPr>
+                      <a:r>
+                        <a:rPr lang="en-US" sz="1400" dirty="0" smtClean="0">
+                          <a:solidFill>
+                            <a:schemeClr val="tx1"/>
+                          </a:solidFill>
+                        </a:rPr>
+                        <a:t>-</a:t>
+                      </a:r>
+                    </a:p>
+                  </a:txBody>
+                  <a:tcPr/>
+                </a:tc>
+                <a:tc>
+                  <a:txBody>
+                    <a:bodyPr/>
+                    <a:lstStyle/>
+                    <a:p>
+                      <a:pPr marL="0" marR="0" indent="0" algn="ctr" defTabSz="457200" rtl="0" eaLnBrk="1" fontAlgn="auto" latinLnBrk="0" hangingPunct="1">
+                        <a:lnSpc>
+                          <a:spcPct val="100000"/>
+                        </a:lnSpc>
+                        <a:spcBef>
+                          <a:spcPts val="0"/>
+                        </a:spcBef>
+                        <a:spcAft>
+                          <a:spcPts val="0"/>
+                        </a:spcAft>
+                        <a:buClrTx/>
+                        <a:buSzTx/>
+                        <a:buFontTx/>
+                        <a:buNone/>
+                        <a:tabLst/>
+                        <a:defRPr/>
+                      </a:pPr>
+                      <a:r>
+                        <a:rPr lang="en-US" sz="1400" dirty="0" smtClean="0">
+                          <a:solidFill>
+                            <a:schemeClr val="tx1"/>
+                          </a:solidFill>
+                        </a:rPr>
+                        <a:t>-</a:t>
+                      </a:r>
+                    </a:p>
+                  </a:txBody>
+                  <a:tcPr>
+                    <a:lnR w="12700" cap="flat" cmpd="sng" algn="ctr">
+                      <a:solidFill>
+                        <a:scrgbClr r="0" g="0" b="0"/>
+                      </a:solidFill>
+                      <a:prstDash val="solid"/>
+                      <a:round/>
+                      <a:headEnd type="none" w="med" len="med"/>
+                      <a:tailEnd type="none" w="med" len="med"/>
+                    </a:lnR>
+                  </a:tcPr>
+                </a:tc>
+              </a:tr>
+              <a:tr h="370840">
+                <a:tc>
+                  <a:txBody>
+                    <a:bodyPr/>
+                    <a:lstStyle/>
+                    <a:p>
+                      <a:r>
+                        <a:rPr lang="en-US" sz="1400" b="1" dirty="0" smtClean="0">
+                          <a:solidFill>
+                            <a:schemeClr val="tx1"/>
+                          </a:solidFill>
+                        </a:rPr>
+                        <a:t>V2</a:t>
+                      </a:r>
+                      <a:endParaRPr lang="en-US" sz="1400" b="1" dirty="0">
+                        <a:solidFill>
+                          <a:schemeClr val="tx1"/>
+                        </a:solidFill>
+                      </a:endParaRPr>
+                    </a:p>
+                  </a:txBody>
+                  <a:tcPr>
+                    <a:lnL w="12700" cap="flat" cmpd="sng" algn="ctr">
+                      <a:solidFill>
+                        <a:scrgbClr r="0" g="0" b="0"/>
+                      </a:solidFill>
+                      <a:prstDash val="solid"/>
+                      <a:round/>
+                      <a:headEnd type="none" w="med" len="med"/>
+                      <a:tailEnd type="none" w="med" len="med"/>
+                    </a:lnL>
+                  </a:tcPr>
+                </a:tc>
+                <a:tc>
+                  <a:txBody>
+                    <a:bodyPr/>
+                    <a:lstStyle/>
+                    <a:p>
+                      <a:pPr marL="0" marR="0" indent="0" algn="ctr" defTabSz="457200" rtl="0" eaLnBrk="1" fontAlgn="auto" latinLnBrk="0" hangingPunct="1">
+                        <a:lnSpc>
+                          <a:spcPct val="100000"/>
+                        </a:lnSpc>
+                        <a:spcBef>
+                          <a:spcPts val="0"/>
+                        </a:spcBef>
+                        <a:spcAft>
+                          <a:spcPts val="0"/>
+                        </a:spcAft>
+                        <a:buClrTx/>
+                        <a:buSzTx/>
+                        <a:buFontTx/>
+                        <a:buNone/>
+                        <a:tabLst/>
+                        <a:defRPr/>
+                      </a:pPr>
+                      <a:r>
+                        <a:rPr lang="en-US" sz="1400" baseline="0" dirty="0" smtClean="0">
+                          <a:solidFill>
+                            <a:schemeClr val="tx1"/>
+                          </a:solidFill>
+                        </a:rPr>
+                        <a:t>-</a:t>
+                      </a:r>
+                    </a:p>
+                  </a:txBody>
+                  <a:tcPr/>
+                </a:tc>
+                <a:tc>
+                  <a:txBody>
+                    <a:bodyPr/>
+                    <a:lstStyle/>
+                    <a:p>
+                      <a:pPr algn="ctr"/>
+                      <a:r>
+                        <a:rPr lang="en-US" sz="1400" dirty="0" smtClean="0">
+                          <a:solidFill>
+                            <a:schemeClr val="tx1"/>
+                          </a:solidFill>
+                        </a:rPr>
+                        <a:t>-</a:t>
+                      </a:r>
+                      <a:endParaRPr lang="en-US" sz="1400" dirty="0" smtClean="0">
+                        <a:solidFill>
+                          <a:schemeClr val="tx1"/>
+                        </a:solidFill>
+                      </a:endParaRPr>
+                    </a:p>
+                  </a:txBody>
+                  <a:tcPr/>
+                </a:tc>
+                <a:tc>
+                  <a:txBody>
+                    <a:bodyPr/>
+                    <a:lstStyle/>
+                    <a:p>
+                      <a:pPr marL="0" marR="0" indent="0" algn="ctr" defTabSz="457200" rtl="0" eaLnBrk="1" fontAlgn="auto" latinLnBrk="0" hangingPunct="1">
+                        <a:lnSpc>
+                          <a:spcPct val="100000"/>
+                        </a:lnSpc>
+                        <a:spcBef>
+                          <a:spcPts val="0"/>
+                        </a:spcBef>
+                        <a:spcAft>
+                          <a:spcPts val="0"/>
+                        </a:spcAft>
+                        <a:buClrTx/>
+                        <a:buSzTx/>
+                        <a:buFontTx/>
+                        <a:buNone/>
+                        <a:tabLst/>
+                        <a:defRPr/>
+                      </a:pPr>
+                      <a:r>
+                        <a:rPr lang="en-US" sz="1400" dirty="0" smtClean="0">
+                          <a:solidFill>
+                            <a:schemeClr val="tx1"/>
+                          </a:solidFill>
+                        </a:rPr>
+                        <a:t>A2</a:t>
+                      </a:r>
+                      <a:endParaRPr lang="en-US" sz="1400" dirty="0" smtClean="0">
+                        <a:solidFill>
+                          <a:schemeClr val="tx1"/>
+                        </a:solidFill>
+                      </a:endParaRPr>
+                    </a:p>
+                  </a:txBody>
+                  <a:tcPr>
+                    <a:lnR w="12700" cap="flat" cmpd="sng" algn="ctr">
+                      <a:solidFill>
+                        <a:scrgbClr r="0" g="0" b="0"/>
+                      </a:solidFill>
+                      <a:prstDash val="solid"/>
+                      <a:round/>
+                      <a:headEnd type="none" w="med" len="med"/>
+                      <a:tailEnd type="none" w="med" len="med"/>
+                    </a:lnR>
+                  </a:tcPr>
+                </a:tc>
+              </a:tr>
+              <a:tr h="370840">
+                <a:tc>
+                  <a:txBody>
+                    <a:bodyPr/>
+                    <a:lstStyle/>
+                    <a:p>
+                      <a:r>
+                        <a:rPr lang="en-US" sz="1400" b="1" dirty="0" smtClean="0">
+                          <a:solidFill>
+                            <a:schemeClr val="tx1"/>
+                          </a:solidFill>
+                        </a:rPr>
+                        <a:t>V3</a:t>
+                      </a:r>
+                      <a:endParaRPr lang="en-US" sz="1400" b="1" dirty="0">
+                        <a:solidFill>
+                          <a:schemeClr val="tx1"/>
+                        </a:solidFill>
+                      </a:endParaRPr>
+                    </a:p>
+                  </a:txBody>
+                  <a:tcPr>
+                    <a:lnL w="12700" cap="flat" cmpd="sng" algn="ctr">
+                      <a:solidFill>
+                        <a:scrgbClr r="0" g="0" b="0"/>
+                      </a:solidFill>
+                      <a:prstDash val="solid"/>
+                      <a:round/>
+                      <a:headEnd type="none" w="med" len="med"/>
+                      <a:tailEnd type="none" w="med" len="med"/>
+                    </a:lnL>
+                  </a:tcPr>
+                </a:tc>
+                <a:tc>
+                  <a:txBody>
+                    <a:bodyPr/>
+                    <a:lstStyle/>
+                    <a:p>
+                      <a:pPr algn="ctr"/>
+                      <a:r>
+                        <a:rPr lang="en-US" sz="1400" baseline="0" dirty="0" smtClean="0">
+                          <a:solidFill>
+                            <a:schemeClr val="tx1"/>
+                          </a:solidFill>
+                        </a:rPr>
+                        <a:t>- </a:t>
+                      </a:r>
+                      <a:endParaRPr lang="en-US" sz="1400" dirty="0">
+                        <a:solidFill>
+                          <a:schemeClr val="tx1"/>
+                        </a:solidFill>
+                      </a:endParaRPr>
+                    </a:p>
+                  </a:txBody>
+                  <a:tcPr/>
+                </a:tc>
+                <a:tc>
+                  <a:txBody>
+                    <a:bodyPr/>
+                    <a:lstStyle/>
+                    <a:p>
+                      <a:pPr marL="0" marR="0" indent="0" algn="ctr" defTabSz="457200" rtl="0" eaLnBrk="1" fontAlgn="auto" latinLnBrk="0" hangingPunct="1">
+                        <a:lnSpc>
+                          <a:spcPct val="100000"/>
+                        </a:lnSpc>
+                        <a:spcBef>
+                          <a:spcPts val="0"/>
+                        </a:spcBef>
+                        <a:spcAft>
+                          <a:spcPts val="0"/>
+                        </a:spcAft>
+                        <a:buClrTx/>
+                        <a:buSzTx/>
+                        <a:buFontTx/>
+                        <a:buNone/>
+                        <a:tabLst/>
+                        <a:defRPr/>
+                      </a:pPr>
+                      <a:r>
+                        <a:rPr lang="en-US" sz="1400" baseline="0" dirty="0" smtClean="0">
+                          <a:solidFill>
+                            <a:schemeClr val="tx1"/>
+                          </a:solidFill>
+                        </a:rPr>
+                        <a:t>-</a:t>
+                      </a:r>
+                      <a:endParaRPr lang="en-US" sz="1400" dirty="0" smtClean="0">
+                        <a:solidFill>
+                          <a:schemeClr val="tx1"/>
+                        </a:solidFill>
+                      </a:endParaRPr>
+                    </a:p>
+                  </a:txBody>
+                  <a:tcPr/>
+                </a:tc>
+                <a:tc>
+                  <a:txBody>
+                    <a:bodyPr/>
+                    <a:lstStyle/>
+                    <a:p>
+                      <a:pPr marL="0" marR="0" indent="0" algn="ctr" defTabSz="457200" rtl="0" eaLnBrk="1" fontAlgn="auto" latinLnBrk="0" hangingPunct="1">
+                        <a:lnSpc>
+                          <a:spcPct val="100000"/>
+                        </a:lnSpc>
+                        <a:spcBef>
+                          <a:spcPts val="0"/>
+                        </a:spcBef>
+                        <a:spcAft>
+                          <a:spcPts val="0"/>
+                        </a:spcAft>
+                        <a:buClrTx/>
+                        <a:buSzTx/>
+                        <a:buFontTx/>
+                        <a:buNone/>
+                        <a:tabLst/>
+                        <a:defRPr/>
+                      </a:pPr>
+                      <a:r>
+                        <a:rPr lang="en-US" sz="1400" dirty="0" smtClean="0">
+                          <a:solidFill>
+                            <a:schemeClr val="tx1"/>
+                          </a:solidFill>
+                        </a:rPr>
+                        <a:t>A3</a:t>
+                      </a:r>
+                      <a:endParaRPr lang="en-US" sz="1400" dirty="0" smtClean="0">
+                        <a:solidFill>
+                          <a:schemeClr val="tx1"/>
+                        </a:solidFill>
+                      </a:endParaRPr>
+                    </a:p>
+                  </a:txBody>
+                  <a:tcPr>
+                    <a:lnR w="12700" cap="flat" cmpd="sng" algn="ctr">
+                      <a:solidFill>
+                        <a:scrgbClr r="0" g="0" b="0"/>
+                      </a:solidFill>
+                      <a:prstDash val="solid"/>
+                      <a:round/>
+                      <a:headEnd type="none" w="med" len="med"/>
+                      <a:tailEnd type="none" w="med" len="med"/>
+                    </a:lnR>
+                  </a:tcPr>
+                </a:tc>
+              </a:tr>
+              <a:tr h="370840">
+                <a:tc>
+                  <a:txBody>
+                    <a:bodyPr/>
+                    <a:lstStyle/>
+                    <a:p>
+                      <a:r>
+                        <a:rPr lang="en-US" sz="1400" b="1" dirty="0" smtClean="0">
+                          <a:solidFill>
+                            <a:schemeClr val="tx1"/>
+                          </a:solidFill>
+                        </a:rPr>
+                        <a:t>V4</a:t>
+                      </a:r>
+                      <a:endParaRPr lang="en-US" sz="1400" b="1" dirty="0">
+                        <a:solidFill>
+                          <a:schemeClr val="tx1"/>
+                        </a:solidFill>
+                      </a:endParaRPr>
+                    </a:p>
+                  </a:txBody>
+                  <a:tcPr>
+                    <a:lnL w="12700" cap="flat" cmpd="sng" algn="ctr">
+                      <a:solidFill>
+                        <a:scrgbClr r="0" g="0" b="0"/>
+                      </a:solidFill>
+                      <a:prstDash val="solid"/>
+                      <a:round/>
+                      <a:headEnd type="none" w="med" len="med"/>
+                      <a:tailEnd type="none" w="med" len="med"/>
+                    </a:lnL>
+                  </a:tcPr>
+                </a:tc>
+                <a:tc>
+                  <a:txBody>
+                    <a:bodyPr/>
+                    <a:lstStyle/>
+                    <a:p>
+                      <a:pPr marL="0" marR="0" indent="0" algn="ctr" defTabSz="457200" rtl="0" eaLnBrk="1" fontAlgn="auto" latinLnBrk="0" hangingPunct="1">
+                        <a:lnSpc>
+                          <a:spcPct val="100000"/>
+                        </a:lnSpc>
+                        <a:spcBef>
+                          <a:spcPts val="0"/>
+                        </a:spcBef>
+                        <a:spcAft>
+                          <a:spcPts val="0"/>
+                        </a:spcAft>
+                        <a:buClrTx/>
+                        <a:buSzTx/>
+                        <a:buFontTx/>
+                        <a:buNone/>
+                        <a:tabLst/>
+                        <a:defRPr/>
+                      </a:pPr>
+                      <a:r>
+                        <a:rPr lang="en-US" sz="1400" dirty="0" smtClean="0">
+                          <a:solidFill>
+                            <a:schemeClr val="tx1"/>
+                          </a:solidFill>
+                        </a:rPr>
+                        <a:t>-</a:t>
+                      </a:r>
+                    </a:p>
+                  </a:txBody>
+                  <a:tcPr/>
+                </a:tc>
+                <a:tc>
+                  <a:txBody>
+                    <a:bodyPr/>
+                    <a:lstStyle/>
+                    <a:p>
+                      <a:pPr marL="0" marR="0" indent="0" algn="ctr" defTabSz="457200" rtl="0" eaLnBrk="1" fontAlgn="auto" latinLnBrk="0" hangingPunct="1">
+                        <a:lnSpc>
+                          <a:spcPct val="100000"/>
+                        </a:lnSpc>
+                        <a:spcBef>
+                          <a:spcPts val="0"/>
+                        </a:spcBef>
+                        <a:spcAft>
+                          <a:spcPts val="0"/>
+                        </a:spcAft>
+                        <a:buClrTx/>
+                        <a:buSzTx/>
+                        <a:buFontTx/>
+                        <a:buNone/>
+                        <a:tabLst/>
+                        <a:defRPr/>
+                      </a:pPr>
+                      <a:r>
+                        <a:rPr lang="en-US" sz="1400" dirty="0" smtClean="0">
+                          <a:solidFill>
+                            <a:schemeClr val="tx1"/>
+                          </a:solidFill>
+                        </a:rPr>
+                        <a:t>A1</a:t>
+                      </a:r>
+                      <a:endParaRPr lang="en-US" sz="1400" dirty="0" smtClean="0">
+                        <a:solidFill>
+                          <a:schemeClr val="tx1"/>
+                        </a:solidFill>
+                      </a:endParaRPr>
+                    </a:p>
+                  </a:txBody>
+                  <a:tcPr/>
+                </a:tc>
+                <a:tc>
+                  <a:txBody>
+                    <a:bodyPr/>
+                    <a:lstStyle/>
+                    <a:p>
+                      <a:pPr marL="0" marR="0" indent="0" algn="ctr" defTabSz="457200" rtl="0" eaLnBrk="1" fontAlgn="auto" latinLnBrk="0" hangingPunct="1">
+                        <a:lnSpc>
+                          <a:spcPct val="100000"/>
+                        </a:lnSpc>
+                        <a:spcBef>
+                          <a:spcPts val="0"/>
+                        </a:spcBef>
+                        <a:spcAft>
+                          <a:spcPts val="0"/>
+                        </a:spcAft>
+                        <a:buClrTx/>
+                        <a:buSzTx/>
+                        <a:buFontTx/>
+                        <a:buNone/>
+                        <a:tabLst/>
+                        <a:defRPr/>
+                      </a:pPr>
+                      <a:r>
+                        <a:rPr lang="en-US" sz="1400" dirty="0" smtClean="0">
+                          <a:solidFill>
+                            <a:schemeClr val="tx1"/>
+                          </a:solidFill>
+                        </a:rPr>
+                        <a:t>A4</a:t>
+                      </a:r>
+                      <a:endParaRPr lang="en-US" sz="1400" dirty="0" smtClean="0">
+                        <a:solidFill>
+                          <a:schemeClr val="tx1"/>
+                        </a:solidFill>
+                      </a:endParaRPr>
+                    </a:p>
+                  </a:txBody>
+                  <a:tcPr>
+                    <a:lnR w="12700" cap="flat" cmpd="sng" algn="ctr">
+                      <a:solidFill>
+                        <a:scrgbClr r="0" g="0" b="0"/>
+                      </a:solidFill>
+                      <a:prstDash val="solid"/>
+                      <a:round/>
+                      <a:headEnd type="none" w="med" len="med"/>
+                      <a:tailEnd type="none" w="med" len="med"/>
+                    </a:lnR>
+                  </a:tcPr>
+                </a:tc>
+              </a:tr>
+              <a:tr h="370840">
+                <a:tc>
+                  <a:txBody>
+                    <a:bodyPr/>
+                    <a:lstStyle/>
+                    <a:p>
+                      <a:r>
+                        <a:rPr lang="en-US" sz="1400" b="1" dirty="0" smtClean="0">
+                          <a:solidFill>
+                            <a:schemeClr val="tx1"/>
+                          </a:solidFill>
+                        </a:rPr>
+                        <a:t>V5</a:t>
+                      </a:r>
+                      <a:endParaRPr lang="en-US" sz="1400" b="1" dirty="0">
+                        <a:solidFill>
+                          <a:schemeClr val="tx1"/>
+                        </a:solidFill>
+                      </a:endParaRPr>
+                    </a:p>
+                  </a:txBody>
+                  <a:tcPr>
+                    <a:lnL w="12700" cap="flat" cmpd="sng" algn="ctr">
+                      <a:solidFill>
+                        <a:scrgbClr r="0" g="0" b="0"/>
+                      </a:solidFill>
+                      <a:prstDash val="solid"/>
+                      <a:round/>
+                      <a:headEnd type="none" w="med" len="med"/>
+                      <a:tailEnd type="none" w="med" len="med"/>
+                    </a:lnL>
+                    <a:lnB w="12700" cap="flat" cmpd="sng" algn="ctr">
+                      <a:solidFill>
+                        <a:scrgbClr r="0" g="0" b="0"/>
+                      </a:solidFill>
+                      <a:prstDash val="solid"/>
+                      <a:round/>
+                      <a:headEnd type="none" w="med" len="med"/>
+                      <a:tailEnd type="none" w="med" len="med"/>
+                    </a:lnB>
+                  </a:tcPr>
+                </a:tc>
+                <a:tc>
+                  <a:txBody>
+                    <a:bodyPr/>
+                    <a:lstStyle/>
+                    <a:p>
+                      <a:pPr marL="0" marR="0" indent="0" algn="ctr" defTabSz="457200" rtl="0" eaLnBrk="1" fontAlgn="auto" latinLnBrk="0" hangingPunct="1">
+                        <a:lnSpc>
+                          <a:spcPct val="100000"/>
+                        </a:lnSpc>
+                        <a:spcBef>
+                          <a:spcPts val="0"/>
+                        </a:spcBef>
+                        <a:spcAft>
+                          <a:spcPts val="0"/>
+                        </a:spcAft>
+                        <a:buClrTx/>
+                        <a:buSzTx/>
+                        <a:buFontTx/>
+                        <a:buNone/>
+                        <a:tabLst/>
+                        <a:defRPr/>
+                      </a:pPr>
+                      <a:r>
+                        <a:rPr lang="en-US" sz="1400" dirty="0" smtClean="0">
+                          <a:solidFill>
+                            <a:schemeClr val="tx1"/>
+                          </a:solidFill>
+                        </a:rPr>
+                        <a:t>-</a:t>
+                      </a:r>
+                    </a:p>
+                  </a:txBody>
+                  <a:tcPr>
+                    <a:lnB w="12700" cap="flat" cmpd="sng" algn="ctr">
+                      <a:solidFill>
+                        <a:scrgbClr r="0" g="0" b="0"/>
+                      </a:solidFill>
+                      <a:prstDash val="solid"/>
+                      <a:round/>
+                      <a:headEnd type="none" w="med" len="med"/>
+                      <a:tailEnd type="none" w="med" len="med"/>
+                    </a:lnB>
+                  </a:tcPr>
+                </a:tc>
+                <a:tc>
+                  <a:txBody>
+                    <a:bodyPr/>
+                    <a:lstStyle/>
+                    <a:p>
+                      <a:pPr marL="0" marR="0" indent="0" algn="ctr" defTabSz="457200" rtl="0" eaLnBrk="1" fontAlgn="auto" latinLnBrk="0" hangingPunct="1">
+                        <a:lnSpc>
+                          <a:spcPct val="100000"/>
+                        </a:lnSpc>
+                        <a:spcBef>
+                          <a:spcPts val="0"/>
+                        </a:spcBef>
+                        <a:spcAft>
+                          <a:spcPts val="0"/>
+                        </a:spcAft>
+                        <a:buClrTx/>
+                        <a:buSzTx/>
+                        <a:buFontTx/>
+                        <a:buNone/>
+                        <a:tabLst/>
+                        <a:defRPr/>
+                      </a:pPr>
+                      <a:r>
+                        <a:rPr lang="en-US" sz="1400" dirty="0" smtClean="0">
+                          <a:solidFill>
+                            <a:schemeClr val="tx1"/>
+                          </a:solidFill>
+                        </a:rPr>
+                        <a:t>-</a:t>
+                      </a:r>
+                    </a:p>
+                  </a:txBody>
+                  <a:tcPr>
+                    <a:lnB w="12700" cap="flat" cmpd="sng" algn="ctr">
+                      <a:solidFill>
+                        <a:scrgbClr r="0" g="0" b="0"/>
+                      </a:solidFill>
+                      <a:prstDash val="solid"/>
+                      <a:round/>
+                      <a:headEnd type="none" w="med" len="med"/>
+                      <a:tailEnd type="none" w="med" len="med"/>
+                    </a:lnB>
+                  </a:tcPr>
+                </a:tc>
+                <a:tc>
+                  <a:txBody>
+                    <a:bodyPr/>
+                    <a:lstStyle/>
+                    <a:p>
+                      <a:pPr marL="0" marR="0" indent="0" algn="ctr" defTabSz="457200" rtl="0" eaLnBrk="1" fontAlgn="auto" latinLnBrk="0" hangingPunct="1">
+                        <a:lnSpc>
+                          <a:spcPct val="100000"/>
+                        </a:lnSpc>
+                        <a:spcBef>
+                          <a:spcPts val="0"/>
+                        </a:spcBef>
+                        <a:spcAft>
+                          <a:spcPts val="0"/>
+                        </a:spcAft>
+                        <a:buClrTx/>
+                        <a:buSzTx/>
+                        <a:buFontTx/>
+                        <a:buNone/>
+                        <a:tabLst/>
+                        <a:defRPr/>
+                      </a:pPr>
+                      <a:r>
+                        <a:rPr lang="en-US" sz="1400" dirty="0" smtClean="0">
+                          <a:solidFill>
+                            <a:schemeClr val="tx1"/>
+                          </a:solidFill>
+                        </a:rPr>
+                        <a:t>A5</a:t>
+                      </a:r>
+                      <a:endParaRPr lang="en-US" sz="1400" dirty="0" smtClean="0">
+                        <a:solidFill>
+                          <a:schemeClr val="tx1"/>
+                        </a:solidFill>
+                      </a:endParaRPr>
+                    </a:p>
+                  </a:txBody>
+                  <a:tcPr>
+                    <a:lnR w="12700" cap="flat" cmpd="sng" algn="ctr">
+                      <a:solidFill>
+                        <a:scrgbClr r="0" g="0" b="0"/>
+                      </a:solidFill>
+                      <a:prstDash val="solid"/>
+                      <a:round/>
+                      <a:headEnd type="none" w="med" len="med"/>
+                      <a:tailEnd type="none" w="med" len="med"/>
+                    </a:lnR>
+                    <a:lnB w="12700" cap="flat" cmpd="sng" algn="ctr">
+                      <a:solidFill>
+                        <a:scrgbClr r="0" g="0" b="0"/>
+                      </a:solidFill>
+                      <a:prstDash val="solid"/>
+                      <a:round/>
+                      <a:headEnd type="none" w="med" len="med"/>
+                      <a:tailEnd type="none" w="med" len="med"/>
+                    </a:lnB>
+                  </a:tcPr>
+                </a:tc>
+              </a:tr>
+            </a:tbl>
+          </a:graphicData>
+        </a:graphic>
+      </p:graphicFrame>
+      <p:sp>
+        <p:nvSpPr>
+          <p:cNvPr id="5" name="Rounded Rectangle 4"/>
+          <p:cNvSpPr/>
+          <p:nvPr/>
+        </p:nvSpPr>
+        <p:spPr>
+          <a:xfrm>
+            <a:off x="5200315" y="3061368"/>
+            <a:ext cx="543699" cy="287049"/>
+          </a:xfrm>
+          <a:prstGeom prst="roundRect">
+            <a:avLst>
+              <a:gd name="adj" fmla="val 12180"/>
+            </a:avLst>
+          </a:prstGeom>
+          <a:noFill/>
+          <a:ln>
+            <a:solidFill>
+              <a:srgbClr val="FF0000"/>
+            </a:solidFill>
+          </a:ln>
+        </p:spPr>
+        <p:style>
+          <a:lnRef idx="2">
+            <a:schemeClr val="dk1"/>
+          </a:lnRef>
+          <a:fillRef idx="1">
+            <a:schemeClr val="lt1"/>
+          </a:fillRef>
+          <a:effectRef idx="0">
+            <a:schemeClr val="dk1"/>
+          </a:effectRef>
+          <a:fontRef idx="minor">
+            <a:schemeClr val="dk1"/>
+          </a:fontRef>
+        </p:style>
+        <p:txBody>
+          <a:bodyPr rtlCol="0" anchor="ctr"/>
+          <a:lstStyle/>
+          <a:p>
+            <a:pPr algn="ctr"/>
+            <a:endParaRPr lang="en-US"/>
+          </a:p>
+        </p:txBody>
+      </p:sp>
+      <p:sp>
+        <p:nvSpPr>
+          <p:cNvPr id="6" name="Rounded Rectangle 5"/>
+          <p:cNvSpPr/>
+          <p:nvPr/>
+        </p:nvSpPr>
+        <p:spPr>
+          <a:xfrm>
+            <a:off x="5053263" y="1770427"/>
+            <a:ext cx="2172456" cy="1924377"/>
+          </a:xfrm>
+          <a:prstGeom prst="roundRect">
+            <a:avLst>
+              <a:gd name="adj" fmla="val 10180"/>
+            </a:avLst>
+          </a:prstGeom>
+          <a:noFill/>
+          <a:ln>
+            <a:solidFill>
+              <a:srgbClr val="FF0000"/>
+            </a:solidFill>
+          </a:ln>
+        </p:spPr>
+        <p:style>
+          <a:lnRef idx="2">
+            <a:schemeClr val="dk1"/>
+          </a:lnRef>
+          <a:fillRef idx="1">
+            <a:schemeClr val="lt1"/>
+          </a:fillRef>
+          <a:effectRef idx="0">
+            <a:schemeClr val="dk1"/>
+          </a:effectRef>
+          <a:fontRef idx="minor">
+            <a:schemeClr val="dk1"/>
+          </a:fontRef>
+        </p:style>
+        <p:txBody>
+          <a:bodyPr rtlCol="0" anchor="ctr"/>
+          <a:lstStyle/>
+          <a:p>
+            <a:pPr algn="ctr"/>
+            <a:endParaRPr lang="en-US"/>
+          </a:p>
+        </p:txBody>
+      </p:sp>
+      <p:sp>
+        <p:nvSpPr>
+          <p:cNvPr id="8" name="TextBox 7"/>
+          <p:cNvSpPr txBox="1"/>
+          <p:nvPr/>
+        </p:nvSpPr>
+        <p:spPr>
+          <a:xfrm>
+            <a:off x="4818811" y="3870133"/>
+            <a:ext cx="1261884" cy="307777"/>
+          </a:xfrm>
+          <a:prstGeom prst="rect">
+            <a:avLst/>
+          </a:prstGeom>
+          <a:noFill/>
+        </p:spPr>
+        <p:txBody>
+          <a:bodyPr wrap="none" rtlCol="0">
+            <a:spAutoFit/>
+          </a:bodyPr>
+          <a:lstStyle/>
+          <a:p>
+            <a:r>
+              <a:rPr lang="en-US" sz="1400" dirty="0" smtClean="0">
+                <a:solidFill>
+                  <a:srgbClr val="FF0000"/>
+                </a:solidFill>
+              </a:rPr>
+              <a:t>Advanced user</a:t>
+            </a:r>
+            <a:endParaRPr lang="en-US" sz="1400" dirty="0">
+              <a:solidFill>
+                <a:srgbClr val="FF0000"/>
+              </a:solidFill>
+            </a:endParaRPr>
+          </a:p>
+        </p:txBody>
+      </p:sp>
+      <p:sp>
+        <p:nvSpPr>
+          <p:cNvPr id="9" name="TextBox 8"/>
+          <p:cNvSpPr txBox="1"/>
+          <p:nvPr/>
+        </p:nvSpPr>
+        <p:spPr>
+          <a:xfrm>
+            <a:off x="6216308" y="3870133"/>
+            <a:ext cx="1009411" cy="307777"/>
+          </a:xfrm>
+          <a:prstGeom prst="rect">
+            <a:avLst/>
+          </a:prstGeom>
+          <a:noFill/>
+        </p:spPr>
+        <p:txBody>
+          <a:bodyPr wrap="none" rtlCol="0">
+            <a:spAutoFit/>
+          </a:bodyPr>
+          <a:lstStyle/>
+          <a:p>
+            <a:r>
+              <a:rPr lang="en-US" sz="1400" dirty="0" smtClean="0">
+                <a:solidFill>
+                  <a:srgbClr val="FF0000"/>
+                </a:solidFill>
+              </a:rPr>
+              <a:t>Power user</a:t>
+            </a:r>
+            <a:endParaRPr lang="en-US" sz="1400" dirty="0">
+              <a:solidFill>
+                <a:srgbClr val="FF0000"/>
+              </a:solidFill>
+            </a:endParaRPr>
+          </a:p>
+        </p:txBody>
+      </p:sp>
+      <p:cxnSp>
+        <p:nvCxnSpPr>
+          <p:cNvPr id="11" name="Straight Arrow Connector 10"/>
+          <p:cNvCxnSpPr/>
+          <p:nvPr/>
+        </p:nvCxnSpPr>
+        <p:spPr>
+          <a:xfrm flipV="1">
+            <a:off x="5342075" y="3348417"/>
+            <a:ext cx="1" cy="500338"/>
+          </a:xfrm>
+          <a:prstGeom prst="straightConnector1">
+            <a:avLst/>
+          </a:prstGeom>
+          <a:ln w="9525" cmpd="sng">
+            <a:solidFill>
+              <a:srgbClr val="FF0000"/>
+            </a:solidFill>
+            <a:headEnd type="none"/>
+            <a:tailEnd type="triangle"/>
+          </a:ln>
+        </p:spPr>
+        <p:style>
+          <a:lnRef idx="2">
+            <a:schemeClr val="accent1"/>
+          </a:lnRef>
+          <a:fillRef idx="0">
+            <a:schemeClr val="accent1"/>
+          </a:fillRef>
+          <a:effectRef idx="1">
+            <a:schemeClr val="accent1"/>
+          </a:effectRef>
+          <a:fontRef idx="minor">
+            <a:schemeClr val="tx1"/>
+          </a:fontRef>
+        </p:style>
+      </p:cxnSp>
+      <p:cxnSp>
+        <p:nvCxnSpPr>
+          <p:cNvPr id="15" name="Straight Arrow Connector 14"/>
+          <p:cNvCxnSpPr/>
+          <p:nvPr/>
+        </p:nvCxnSpPr>
+        <p:spPr>
+          <a:xfrm flipV="1">
+            <a:off x="6745265" y="3694804"/>
+            <a:ext cx="1" cy="153951"/>
+          </a:xfrm>
+          <a:prstGeom prst="straightConnector1">
+            <a:avLst/>
+          </a:prstGeom>
+          <a:ln w="9525" cmpd="sng">
+            <a:solidFill>
+              <a:srgbClr val="FF0000"/>
+            </a:solidFill>
+            <a:headEnd type="none"/>
+            <a:tailEnd type="triangle"/>
+          </a:ln>
+        </p:spPr>
+        <p:style>
+          <a:lnRef idx="2">
+            <a:schemeClr val="accent1"/>
+          </a:lnRef>
+          <a:fillRef idx="0">
+            <a:schemeClr val="accent1"/>
+          </a:fillRef>
+          <a:effectRef idx="1">
+            <a:schemeClr val="accent1"/>
+          </a:effectRef>
+          <a:fontRef idx="minor">
+            <a:schemeClr val="tx1"/>
+          </a:fontRef>
+        </p:style>
+      </p:cxnSp>
+    </p:spTree>
+    <p:extLst>
+      <p:ext uri="{BB962C8B-B14F-4D97-AF65-F5344CB8AC3E}">
+        <p14:creationId xmlns:p14="http://schemas.microsoft.com/office/powerpoint/2010/main" val="1632701152"/>
+      </p:ext>
+    </p:extLst>
+  </p:cSld>
+  <p:clrMapOvr>
+    <a:masterClrMapping/>
+  </p:clrMapOvr>
+</p:sld>
+</file>
+
 <file path=ppt/slides/slide2.xml><?xml version="1.0" encoding="utf-8"?>
 <p:sld xmlns:a="http://schemas.openxmlformats.org/drawingml/2006/main" xmlns:r="http://schemas.openxmlformats.org/officeDocument/2006/relationships" xmlns:p="http://schemas.openxmlformats.org/presentationml/2006/main">
   <p:cSld>
@@ -8545,6 +9779,689 @@
     <p:extLst>
       <p:ext uri="{BB962C8B-B14F-4D97-AF65-F5344CB8AC3E}">
         <p14:creationId xmlns:p14="http://schemas.microsoft.com/office/powerpoint/2010/main" val="2006859667"/>
+      </p:ext>
+    </p:extLst>
+  </p:cSld>
+  <p:clrMapOvr>
+    <a:masterClrMapping/>
+  </p:clrMapOvr>
+</p:sld>
+</file>
+
+<file path=ppt/slides/slide9.xml><?xml version="1.0" encoding="utf-8"?>
+<p:sld xmlns:a="http://schemas.openxmlformats.org/drawingml/2006/main" xmlns:r="http://schemas.openxmlformats.org/officeDocument/2006/relationships" xmlns:p="http://schemas.openxmlformats.org/presentationml/2006/main">
+  <p:cSld>
+    <p:spTree>
+      <p:nvGrpSpPr>
+        <p:cNvPr id="1" name=""/>
+        <p:cNvGrpSpPr/>
+        <p:nvPr/>
+      </p:nvGrpSpPr>
+      <p:grpSpPr>
+        <a:xfrm>
+          <a:off x="0" y="0"/>
+          <a:ext cx="0" cy="0"/>
+          <a:chOff x="0" y="0"/>
+          <a:chExt cx="0" cy="0"/>
+        </a:xfrm>
+      </p:grpSpPr>
+      <p:sp>
+        <p:nvSpPr>
+          <p:cNvPr id="4" name="Rectangle 3"/>
+          <p:cNvSpPr/>
+          <p:nvPr/>
+        </p:nvSpPr>
+        <p:spPr>
+          <a:xfrm>
+            <a:off x="3733134" y="1000676"/>
+            <a:ext cx="3502212" cy="2712159"/>
+          </a:xfrm>
+          <a:prstGeom prst="rect">
+            <a:avLst/>
+          </a:prstGeom>
+          <a:noFill/>
+          <a:ln w="12700" cmpd="sng"/>
+        </p:spPr>
+        <p:style>
+          <a:lnRef idx="2">
+            <a:schemeClr val="dk1"/>
+          </a:lnRef>
+          <a:fillRef idx="1">
+            <a:schemeClr val="lt1"/>
+          </a:fillRef>
+          <a:effectRef idx="0">
+            <a:schemeClr val="dk1"/>
+          </a:effectRef>
+          <a:fontRef idx="minor">
+            <a:schemeClr val="dk1"/>
+          </a:fontRef>
+        </p:style>
+        <p:txBody>
+          <a:bodyPr rtlCol="0" anchor="ctr"/>
+          <a:lstStyle/>
+          <a:p>
+            <a:pPr algn="ctr"/>
+            <a:endParaRPr lang="en-US" sz="1400" dirty="0" smtClean="0"/>
+          </a:p>
+          <a:p>
+            <a:pPr algn="ctr"/>
+            <a:endParaRPr lang="en-US" sz="1400" dirty="0"/>
+          </a:p>
+          <a:p>
+            <a:pPr algn="ctr"/>
+            <a:endParaRPr lang="en-US" sz="1400" dirty="0" smtClean="0"/>
+          </a:p>
+          <a:p>
+            <a:pPr algn="ctr"/>
+            <a:endParaRPr lang="en-US" sz="1400" dirty="0"/>
+          </a:p>
+          <a:p>
+            <a:pPr algn="ctr"/>
+            <a:endParaRPr lang="en-US" sz="1400" dirty="0" smtClean="0"/>
+          </a:p>
+          <a:p>
+            <a:pPr algn="ctr"/>
+            <a:endParaRPr lang="en-US" sz="1400" dirty="0"/>
+          </a:p>
+          <a:p>
+            <a:pPr algn="ctr"/>
+            <a:endParaRPr lang="en-US" sz="1400" dirty="0" smtClean="0"/>
+          </a:p>
+          <a:p>
+            <a:pPr algn="ctr"/>
+            <a:endParaRPr lang="en-US" sz="1400" dirty="0"/>
+          </a:p>
+          <a:p>
+            <a:pPr algn="ctr"/>
+            <a:endParaRPr lang="en-US" sz="1400" dirty="0" smtClean="0"/>
+          </a:p>
+          <a:p>
+            <a:pPr algn="ctr"/>
+            <a:endParaRPr lang="en-US" sz="1400" dirty="0" smtClean="0"/>
+          </a:p>
+          <a:p>
+            <a:pPr algn="ctr"/>
+            <a:endParaRPr lang="en-US" sz="1400" dirty="0" smtClean="0"/>
+          </a:p>
+          <a:p>
+            <a:pPr algn="ctr"/>
+            <a:r>
+              <a:rPr lang="en-US" sz="1400" dirty="0" smtClean="0"/>
+              <a:t>Application Process</a:t>
+            </a:r>
+            <a:endParaRPr lang="en-US" sz="1400" dirty="0"/>
+          </a:p>
+        </p:txBody>
+      </p:sp>
+      <p:sp>
+        <p:nvSpPr>
+          <p:cNvPr id="5" name="Rectangle 4"/>
+          <p:cNvSpPr/>
+          <p:nvPr/>
+        </p:nvSpPr>
+        <p:spPr>
+          <a:xfrm>
+            <a:off x="1797676" y="3712836"/>
+            <a:ext cx="5437669" cy="588148"/>
+          </a:xfrm>
+          <a:prstGeom prst="rect">
+            <a:avLst/>
+          </a:prstGeom>
+          <a:noFill/>
+          <a:ln w="12700" cmpd="sng"/>
+        </p:spPr>
+        <p:style>
+          <a:lnRef idx="2">
+            <a:schemeClr val="dk1"/>
+          </a:lnRef>
+          <a:fillRef idx="1">
+            <a:schemeClr val="lt1"/>
+          </a:fillRef>
+          <a:effectRef idx="0">
+            <a:schemeClr val="dk1"/>
+          </a:effectRef>
+          <a:fontRef idx="minor">
+            <a:schemeClr val="dk1"/>
+          </a:fontRef>
+        </p:style>
+        <p:txBody>
+          <a:bodyPr rtlCol="0" anchor="ctr"/>
+          <a:lstStyle/>
+          <a:p>
+            <a:pPr algn="ctr"/>
+            <a:r>
+              <a:rPr lang="en-US" sz="1400" dirty="0" smtClean="0"/>
+              <a:t>Operating System Kernel</a:t>
+            </a:r>
+            <a:endParaRPr lang="en-US" sz="1400" dirty="0"/>
+          </a:p>
+        </p:txBody>
+      </p:sp>
+      <p:sp>
+        <p:nvSpPr>
+          <p:cNvPr id="10" name="Rectangle 9"/>
+          <p:cNvSpPr/>
+          <p:nvPr/>
+        </p:nvSpPr>
+        <p:spPr>
+          <a:xfrm>
+            <a:off x="1876191" y="1000676"/>
+            <a:ext cx="1751107" cy="2636564"/>
+          </a:xfrm>
+          <a:prstGeom prst="rect">
+            <a:avLst/>
+          </a:prstGeom>
+          <a:ln w="12700" cmpd="sng"/>
+        </p:spPr>
+        <p:style>
+          <a:lnRef idx="2">
+            <a:schemeClr val="dk1"/>
+          </a:lnRef>
+          <a:fillRef idx="1">
+            <a:schemeClr val="lt1"/>
+          </a:fillRef>
+          <a:effectRef idx="0">
+            <a:schemeClr val="dk1"/>
+          </a:effectRef>
+          <a:fontRef idx="minor">
+            <a:schemeClr val="dk1"/>
+          </a:fontRef>
+        </p:style>
+        <p:txBody>
+          <a:bodyPr rtlCol="0" anchor="ctr"/>
+          <a:lstStyle/>
+          <a:p>
+            <a:pPr algn="ctr"/>
+            <a:r>
+              <a:rPr lang="en-US" sz="1400" dirty="0" smtClean="0"/>
+              <a:t>Application &amp; System </a:t>
+            </a:r>
+            <a:r>
+              <a:rPr lang="en-US" sz="1400" dirty="0"/>
+              <a:t>P</a:t>
+            </a:r>
+            <a:r>
+              <a:rPr lang="en-US" sz="1400" dirty="0" smtClean="0"/>
+              <a:t>rocesses</a:t>
+            </a:r>
+            <a:endParaRPr lang="en-US" sz="1400" dirty="0"/>
+          </a:p>
+        </p:txBody>
+      </p:sp>
+      <p:sp>
+        <p:nvSpPr>
+          <p:cNvPr id="12" name="Rectangle 11"/>
+          <p:cNvSpPr/>
+          <p:nvPr/>
+        </p:nvSpPr>
+        <p:spPr>
+          <a:xfrm>
+            <a:off x="5080979" y="1132424"/>
+            <a:ext cx="1000208" cy="966421"/>
+          </a:xfrm>
+          <a:prstGeom prst="rect">
+            <a:avLst/>
+          </a:prstGeom>
+          <a:ln w="12700" cmpd="sng"/>
+        </p:spPr>
+        <p:style>
+          <a:lnRef idx="2">
+            <a:schemeClr val="dk1"/>
+          </a:lnRef>
+          <a:fillRef idx="1">
+            <a:schemeClr val="lt1"/>
+          </a:fillRef>
+          <a:effectRef idx="0">
+            <a:schemeClr val="dk1"/>
+          </a:effectRef>
+          <a:fontRef idx="minor">
+            <a:schemeClr val="dk1"/>
+          </a:fontRef>
+        </p:style>
+        <p:txBody>
+          <a:bodyPr rtlCol="0" anchor="ctr"/>
+          <a:lstStyle/>
+          <a:p>
+            <a:pPr algn="ctr"/>
+            <a:r>
+              <a:rPr lang="en-US" sz="1400" dirty="0" smtClean="0"/>
+              <a:t>Client Sandbox</a:t>
+            </a:r>
+          </a:p>
+        </p:txBody>
+      </p:sp>
+      <p:sp>
+        <p:nvSpPr>
+          <p:cNvPr id="13" name="Rectangle 12"/>
+          <p:cNvSpPr/>
+          <p:nvPr/>
+        </p:nvSpPr>
+        <p:spPr>
+          <a:xfrm>
+            <a:off x="3819721" y="2232529"/>
+            <a:ext cx="3343617" cy="381627"/>
+          </a:xfrm>
+          <a:prstGeom prst="rect">
+            <a:avLst/>
+          </a:prstGeom>
+          <a:solidFill>
+            <a:schemeClr val="bg1">
+              <a:lumMod val="85000"/>
+            </a:schemeClr>
+          </a:solidFill>
+          <a:ln w="12700" cmpd="sng"/>
+        </p:spPr>
+        <p:style>
+          <a:lnRef idx="2">
+            <a:schemeClr val="dk1"/>
+          </a:lnRef>
+          <a:fillRef idx="1">
+            <a:schemeClr val="lt1"/>
+          </a:fillRef>
+          <a:effectRef idx="0">
+            <a:schemeClr val="dk1"/>
+          </a:effectRef>
+          <a:fontRef idx="minor">
+            <a:schemeClr val="dk1"/>
+          </a:fontRef>
+        </p:style>
+        <p:txBody>
+          <a:bodyPr rtlCol="0" anchor="ctr"/>
+          <a:lstStyle/>
+          <a:p>
+            <a:pPr algn="ctr"/>
+            <a:r>
+              <a:rPr lang="en-US" sz="1400" dirty="0" smtClean="0"/>
+              <a:t>Hyperty Runtime</a:t>
+            </a:r>
+            <a:endParaRPr lang="en-US" sz="1400" dirty="0"/>
+          </a:p>
+        </p:txBody>
+      </p:sp>
+      <p:sp>
+        <p:nvSpPr>
+          <p:cNvPr id="14" name="Rectangle 13"/>
+          <p:cNvSpPr/>
+          <p:nvPr/>
+        </p:nvSpPr>
+        <p:spPr>
+          <a:xfrm>
+            <a:off x="6163131" y="1209400"/>
+            <a:ext cx="1000208" cy="1023129"/>
+          </a:xfrm>
+          <a:prstGeom prst="rect">
+            <a:avLst/>
+          </a:prstGeom>
+          <a:solidFill>
+            <a:schemeClr val="bg1">
+              <a:lumMod val="85000"/>
+            </a:schemeClr>
+          </a:solidFill>
+          <a:ln w="12700" cmpd="sng"/>
+        </p:spPr>
+        <p:style>
+          <a:lnRef idx="2">
+            <a:schemeClr val="dk1"/>
+          </a:lnRef>
+          <a:fillRef idx="1">
+            <a:schemeClr val="lt1"/>
+          </a:fillRef>
+          <a:effectRef idx="0">
+            <a:schemeClr val="dk1"/>
+          </a:effectRef>
+          <a:fontRef idx="minor">
+            <a:schemeClr val="dk1"/>
+          </a:fontRef>
+        </p:style>
+        <p:txBody>
+          <a:bodyPr rtlCol="0" anchor="ctr"/>
+          <a:lstStyle/>
+          <a:p>
+            <a:pPr algn="ctr"/>
+            <a:r>
+              <a:rPr lang="en-US" sz="1400" dirty="0" smtClean="0"/>
+              <a:t>Core Sandbox</a:t>
+            </a:r>
+            <a:endParaRPr lang="en-US" sz="1400" dirty="0"/>
+          </a:p>
+        </p:txBody>
+      </p:sp>
+      <p:sp>
+        <p:nvSpPr>
+          <p:cNvPr id="15" name="Rectangle 14"/>
+          <p:cNvSpPr/>
+          <p:nvPr/>
+        </p:nvSpPr>
+        <p:spPr>
+          <a:xfrm>
+            <a:off x="3896697" y="1142047"/>
+            <a:ext cx="1000208" cy="956798"/>
+          </a:xfrm>
+          <a:prstGeom prst="rect">
+            <a:avLst/>
+          </a:prstGeom>
+          <a:ln w="12700" cmpd="sng"/>
+        </p:spPr>
+        <p:style>
+          <a:lnRef idx="2">
+            <a:schemeClr val="dk1"/>
+          </a:lnRef>
+          <a:fillRef idx="1">
+            <a:schemeClr val="lt1"/>
+          </a:fillRef>
+          <a:effectRef idx="0">
+            <a:schemeClr val="dk1"/>
+          </a:effectRef>
+          <a:fontRef idx="minor">
+            <a:schemeClr val="dk1"/>
+          </a:fontRef>
+        </p:style>
+        <p:txBody>
+          <a:bodyPr rtlCol="0" anchor="ctr"/>
+          <a:lstStyle/>
+          <a:p>
+            <a:pPr algn="ctr"/>
+            <a:r>
+              <a:rPr lang="en-US" sz="1400" dirty="0" smtClean="0"/>
+              <a:t>Application Sandbox</a:t>
+            </a:r>
+            <a:endParaRPr lang="en-US" sz="1400" dirty="0"/>
+          </a:p>
+        </p:txBody>
+      </p:sp>
+      <p:sp>
+        <p:nvSpPr>
+          <p:cNvPr id="16" name="Rectangle 15"/>
+          <p:cNvSpPr/>
+          <p:nvPr/>
+        </p:nvSpPr>
+        <p:spPr>
+          <a:xfrm>
+            <a:off x="3819722" y="1209400"/>
+            <a:ext cx="1000208" cy="1023129"/>
+          </a:xfrm>
+          <a:prstGeom prst="rect">
+            <a:avLst/>
+          </a:prstGeom>
+          <a:ln w="12700" cmpd="sng"/>
+        </p:spPr>
+        <p:style>
+          <a:lnRef idx="2">
+            <a:schemeClr val="dk1"/>
+          </a:lnRef>
+          <a:fillRef idx="1">
+            <a:schemeClr val="lt1"/>
+          </a:fillRef>
+          <a:effectRef idx="0">
+            <a:schemeClr val="dk1"/>
+          </a:effectRef>
+          <a:fontRef idx="minor">
+            <a:schemeClr val="dk1"/>
+          </a:fontRef>
+        </p:style>
+        <p:txBody>
+          <a:bodyPr rtlCol="0" anchor="ctr"/>
+          <a:lstStyle/>
+          <a:p>
+            <a:pPr algn="ctr"/>
+            <a:r>
+              <a:rPr lang="en-US" sz="1400" dirty="0" smtClean="0"/>
+              <a:t>App</a:t>
+            </a:r>
+          </a:p>
+          <a:p>
+            <a:pPr algn="ctr"/>
+            <a:r>
+              <a:rPr lang="en-US" sz="1400" dirty="0" smtClean="0"/>
+              <a:t>Sandbox</a:t>
+            </a:r>
+            <a:endParaRPr lang="en-US" sz="1400" dirty="0"/>
+          </a:p>
+        </p:txBody>
+      </p:sp>
+      <p:sp>
+        <p:nvSpPr>
+          <p:cNvPr id="17" name="Rectangle 16"/>
+          <p:cNvSpPr/>
+          <p:nvPr/>
+        </p:nvSpPr>
+        <p:spPr>
+          <a:xfrm>
+            <a:off x="5012086" y="1209400"/>
+            <a:ext cx="1000208" cy="1023129"/>
+          </a:xfrm>
+          <a:prstGeom prst="rect">
+            <a:avLst/>
+          </a:prstGeom>
+          <a:ln w="12700" cmpd="sng"/>
+        </p:spPr>
+        <p:style>
+          <a:lnRef idx="2">
+            <a:schemeClr val="dk1"/>
+          </a:lnRef>
+          <a:fillRef idx="1">
+            <a:schemeClr val="lt1"/>
+          </a:fillRef>
+          <a:effectRef idx="0">
+            <a:schemeClr val="dk1"/>
+          </a:effectRef>
+          <a:fontRef idx="minor">
+            <a:schemeClr val="dk1"/>
+          </a:fontRef>
+        </p:style>
+        <p:txBody>
+          <a:bodyPr rtlCol="0" anchor="ctr"/>
+          <a:lstStyle/>
+          <a:p>
+            <a:pPr algn="ctr"/>
+            <a:r>
+              <a:rPr lang="en-US" sz="1400" dirty="0" smtClean="0"/>
+              <a:t>Client Sandbox</a:t>
+            </a:r>
+          </a:p>
+        </p:txBody>
+      </p:sp>
+      <p:sp>
+        <p:nvSpPr>
+          <p:cNvPr id="18" name="Rectangle 17"/>
+          <p:cNvSpPr/>
+          <p:nvPr/>
+        </p:nvSpPr>
+        <p:spPr>
+          <a:xfrm>
+            <a:off x="1797676" y="1106516"/>
+            <a:ext cx="1751107" cy="2607699"/>
+          </a:xfrm>
+          <a:prstGeom prst="rect">
+            <a:avLst/>
+          </a:prstGeom>
+          <a:ln w="12700" cmpd="sng"/>
+        </p:spPr>
+        <p:style>
+          <a:lnRef idx="2">
+            <a:schemeClr val="dk1"/>
+          </a:lnRef>
+          <a:fillRef idx="1">
+            <a:schemeClr val="lt1"/>
+          </a:fillRef>
+          <a:effectRef idx="0">
+            <a:schemeClr val="dk1"/>
+          </a:effectRef>
+          <a:fontRef idx="minor">
+            <a:schemeClr val="dk1"/>
+          </a:fontRef>
+        </p:style>
+        <p:txBody>
+          <a:bodyPr rtlCol="0" anchor="ctr"/>
+          <a:lstStyle/>
+          <a:p>
+            <a:pPr algn="ctr"/>
+            <a:r>
+              <a:rPr lang="en-US" sz="1400" dirty="0" smtClean="0"/>
+              <a:t>Standalone Applications</a:t>
+            </a:r>
+          </a:p>
+          <a:p>
+            <a:pPr algn="ctr"/>
+            <a:r>
+              <a:rPr lang="en-US" sz="1400" dirty="0" smtClean="0"/>
+              <a:t>&amp; </a:t>
+            </a:r>
+          </a:p>
+          <a:p>
+            <a:pPr algn="ctr"/>
+            <a:r>
+              <a:rPr lang="en-US" sz="1400" dirty="0" smtClean="0"/>
+              <a:t>Operating System </a:t>
+            </a:r>
+            <a:r>
+              <a:rPr lang="en-US" sz="1400" dirty="0"/>
+              <a:t>P</a:t>
+            </a:r>
+            <a:r>
+              <a:rPr lang="en-US" sz="1400" dirty="0" smtClean="0"/>
+              <a:t>rocesses</a:t>
+            </a:r>
+            <a:endParaRPr lang="en-US" sz="1400" dirty="0"/>
+          </a:p>
+        </p:txBody>
+      </p:sp>
+      <p:sp>
+        <p:nvSpPr>
+          <p:cNvPr id="19" name="Rectangle 18"/>
+          <p:cNvSpPr/>
+          <p:nvPr/>
+        </p:nvSpPr>
+        <p:spPr>
+          <a:xfrm>
+            <a:off x="1797676" y="4300984"/>
+            <a:ext cx="5437669" cy="588148"/>
+          </a:xfrm>
+          <a:prstGeom prst="rect">
+            <a:avLst/>
+          </a:prstGeom>
+          <a:noFill/>
+          <a:ln w="12700" cmpd="sng"/>
+        </p:spPr>
+        <p:style>
+          <a:lnRef idx="2">
+            <a:schemeClr val="dk1"/>
+          </a:lnRef>
+          <a:fillRef idx="1">
+            <a:schemeClr val="lt1"/>
+          </a:fillRef>
+          <a:effectRef idx="0">
+            <a:schemeClr val="dk1"/>
+          </a:effectRef>
+          <a:fontRef idx="minor">
+            <a:schemeClr val="dk1"/>
+          </a:fontRef>
+        </p:style>
+        <p:txBody>
+          <a:bodyPr rtlCol="0" anchor="ctr"/>
+          <a:lstStyle/>
+          <a:p>
+            <a:pPr algn="ctr"/>
+            <a:r>
+              <a:rPr lang="en-US" sz="1400" dirty="0" smtClean="0"/>
+              <a:t>Hardware</a:t>
+            </a:r>
+            <a:endParaRPr lang="en-US" sz="1400" dirty="0"/>
+          </a:p>
+        </p:txBody>
+      </p:sp>
+      <p:sp>
+        <p:nvSpPr>
+          <p:cNvPr id="20" name="Rectangle 19"/>
+          <p:cNvSpPr/>
+          <p:nvPr/>
+        </p:nvSpPr>
+        <p:spPr>
+          <a:xfrm>
+            <a:off x="3819721" y="2614156"/>
+            <a:ext cx="3343617" cy="381627"/>
+          </a:xfrm>
+          <a:prstGeom prst="rect">
+            <a:avLst/>
+          </a:prstGeom>
+          <a:noFill/>
+          <a:ln w="12700" cmpd="sng"/>
+        </p:spPr>
+        <p:style>
+          <a:lnRef idx="2">
+            <a:schemeClr val="dk1"/>
+          </a:lnRef>
+          <a:fillRef idx="1">
+            <a:schemeClr val="lt1"/>
+          </a:fillRef>
+          <a:effectRef idx="0">
+            <a:schemeClr val="dk1"/>
+          </a:effectRef>
+          <a:fontRef idx="minor">
+            <a:schemeClr val="dk1"/>
+          </a:fontRef>
+        </p:style>
+        <p:txBody>
+          <a:bodyPr rtlCol="0" anchor="ctr"/>
+          <a:lstStyle/>
+          <a:p>
+            <a:pPr algn="ctr"/>
+            <a:r>
+              <a:rPr lang="en-US" sz="1400" dirty="0" smtClean="0"/>
+              <a:t>Common Adaptation Layer</a:t>
+            </a:r>
+            <a:endParaRPr lang="en-US" sz="1400" dirty="0"/>
+          </a:p>
+        </p:txBody>
+      </p:sp>
+      <p:sp>
+        <p:nvSpPr>
+          <p:cNvPr id="21" name="Rectangle 20"/>
+          <p:cNvSpPr/>
+          <p:nvPr/>
+        </p:nvSpPr>
+        <p:spPr>
+          <a:xfrm>
+            <a:off x="3819721" y="2995783"/>
+            <a:ext cx="3343617" cy="381627"/>
+          </a:xfrm>
+          <a:prstGeom prst="rect">
+            <a:avLst/>
+          </a:prstGeom>
+          <a:noFill/>
+          <a:ln w="12700" cmpd="sng"/>
+        </p:spPr>
+        <p:style>
+          <a:lnRef idx="2">
+            <a:schemeClr val="dk1"/>
+          </a:lnRef>
+          <a:fillRef idx="1">
+            <a:schemeClr val="lt1"/>
+          </a:fillRef>
+          <a:effectRef idx="0">
+            <a:schemeClr val="dk1"/>
+          </a:effectRef>
+          <a:fontRef idx="minor">
+            <a:schemeClr val="dk1"/>
+          </a:fontRef>
+        </p:style>
+        <p:txBody>
+          <a:bodyPr rtlCol="0" anchor="ctr"/>
+          <a:lstStyle/>
+          <a:p>
+            <a:pPr algn="ctr"/>
+            <a:r>
+              <a:rPr lang="en-US" sz="1400" dirty="0" smtClean="0"/>
+              <a:t>OS-Specific Layer</a:t>
+            </a:r>
+            <a:endParaRPr lang="en-US" sz="1400" dirty="0"/>
+          </a:p>
+        </p:txBody>
+      </p:sp>
+    </p:spTree>
+    <p:extLst>
+      <p:ext uri="{BB962C8B-B14F-4D97-AF65-F5344CB8AC3E}">
+        <p14:creationId xmlns:p14="http://schemas.microsoft.com/office/powerpoint/2010/main" val="3301415053"/>
       </p:ext>
     </p:extLst>
   </p:cSld>

</xml_diff>

<commit_message>
updated figures, replaced application with hiperty as name, updated the powerpoint of figures as well
</commit_message>
<xml_diff>
--- a/docs/specs/runtime/securityanalysis_figs.pptx
+++ b/docs/specs/runtime/securityanalysis_figs.pptx
@@ -113,6 +113,22 @@
       </a:defRPr>
     </a:lvl9pPr>
   </p:defaultTextStyle>
+  <p:extLst>
+    <p:ext uri="{EFAFB233-063F-42B5-8137-9DF3F51BA10A}">
+      <p15:sldGuideLst xmlns:p15="http://schemas.microsoft.com/office/powerpoint/2012/main">
+        <p15:guide id="1" orient="horz" pos="2160">
+          <p15:clr>
+            <a:srgbClr val="A4A3A4"/>
+          </p15:clr>
+        </p15:guide>
+        <p15:guide id="2" pos="2880">
+          <p15:clr>
+            <a:srgbClr val="A4A3A4"/>
+          </p15:clr>
+        </p15:guide>
+      </p15:sldGuideLst>
+    </p:ext>
+  </p:extLst>
 </p:presentation>
 </file>
 
@@ -297,7 +313,7 @@
           <a:p>
             <a:fld id="{07B27951-8294-EF40-9558-AC697FB84744}" type="datetimeFigureOut">
               <a:rPr lang="en-US" smtClean="0"/>
-              <a:t>11/09/15</a:t>
+              <a:t>9/14/2015</a:t>
             </a:fld>
             <a:endParaRPr lang="en-US"/>
           </a:p>
@@ -467,7 +483,7 @@
           <a:p>
             <a:fld id="{07B27951-8294-EF40-9558-AC697FB84744}" type="datetimeFigureOut">
               <a:rPr lang="en-US" smtClean="0"/>
-              <a:t>11/09/15</a:t>
+              <a:t>9/14/2015</a:t>
             </a:fld>
             <a:endParaRPr lang="en-US"/>
           </a:p>
@@ -647,7 +663,7 @@
           <a:p>
             <a:fld id="{07B27951-8294-EF40-9558-AC697FB84744}" type="datetimeFigureOut">
               <a:rPr lang="en-US" smtClean="0"/>
-              <a:t>11/09/15</a:t>
+              <a:t>9/14/2015</a:t>
             </a:fld>
             <a:endParaRPr lang="en-US"/>
           </a:p>
@@ -817,7 +833,7 @@
           <a:p>
             <a:fld id="{07B27951-8294-EF40-9558-AC697FB84744}" type="datetimeFigureOut">
               <a:rPr lang="en-US" smtClean="0"/>
-              <a:t>11/09/15</a:t>
+              <a:t>9/14/2015</a:t>
             </a:fld>
             <a:endParaRPr lang="en-US"/>
           </a:p>
@@ -1063,7 +1079,7 @@
           <a:p>
             <a:fld id="{07B27951-8294-EF40-9558-AC697FB84744}" type="datetimeFigureOut">
               <a:rPr lang="en-US" smtClean="0"/>
-              <a:t>11/09/15</a:t>
+              <a:t>9/14/2015</a:t>
             </a:fld>
             <a:endParaRPr lang="en-US"/>
           </a:p>
@@ -1351,7 +1367,7 @@
           <a:p>
             <a:fld id="{07B27951-8294-EF40-9558-AC697FB84744}" type="datetimeFigureOut">
               <a:rPr lang="en-US" smtClean="0"/>
-              <a:t>11/09/15</a:t>
+              <a:t>9/14/2015</a:t>
             </a:fld>
             <a:endParaRPr lang="en-US"/>
           </a:p>
@@ -1773,7 +1789,7 @@
           <a:p>
             <a:fld id="{07B27951-8294-EF40-9558-AC697FB84744}" type="datetimeFigureOut">
               <a:rPr lang="en-US" smtClean="0"/>
-              <a:t>11/09/15</a:t>
+              <a:t>9/14/2015</a:t>
             </a:fld>
             <a:endParaRPr lang="en-US"/>
           </a:p>
@@ -1891,7 +1907,7 @@
           <a:p>
             <a:fld id="{07B27951-8294-EF40-9558-AC697FB84744}" type="datetimeFigureOut">
               <a:rPr lang="en-US" smtClean="0"/>
-              <a:t>11/09/15</a:t>
+              <a:t>9/14/2015</a:t>
             </a:fld>
             <a:endParaRPr lang="en-US"/>
           </a:p>
@@ -1986,7 +2002,7 @@
           <a:p>
             <a:fld id="{07B27951-8294-EF40-9558-AC697FB84744}" type="datetimeFigureOut">
               <a:rPr lang="en-US" smtClean="0"/>
-              <a:t>11/09/15</a:t>
+              <a:t>9/14/2015</a:t>
             </a:fld>
             <a:endParaRPr lang="en-US"/>
           </a:p>
@@ -2263,7 +2279,7 @@
           <a:p>
             <a:fld id="{07B27951-8294-EF40-9558-AC697FB84744}" type="datetimeFigureOut">
               <a:rPr lang="en-US" smtClean="0"/>
-              <a:t>11/09/15</a:t>
+              <a:t>9/14/2015</a:t>
             </a:fld>
             <a:endParaRPr lang="en-US"/>
           </a:p>
@@ -2516,7 +2532,7 @@
           <a:p>
             <a:fld id="{07B27951-8294-EF40-9558-AC697FB84744}" type="datetimeFigureOut">
               <a:rPr lang="en-US" smtClean="0"/>
-              <a:t>11/09/15</a:t>
+              <a:t>9/14/2015</a:t>
             </a:fld>
             <a:endParaRPr lang="en-US"/>
           </a:p>
@@ -2729,7 +2745,7 @@
           <a:p>
             <a:fld id="{07B27951-8294-EF40-9558-AC697FB84744}" type="datetimeFigureOut">
               <a:rPr lang="en-US" smtClean="0"/>
-              <a:t>11/09/15</a:t>
+              <a:t>9/14/2015</a:t>
             </a:fld>
             <a:endParaRPr lang="en-US"/>
           </a:p>
@@ -7495,15 +7511,7 @@
                   <a:srgbClr val="FF0000"/>
                 </a:solidFill>
               </a:rPr>
-              <a:t>1 </a:t>
-            </a:r>
-            <a:r>
-              <a:rPr lang="en-US" sz="1400" dirty="0" smtClean="0">
-                <a:solidFill>
-                  <a:srgbClr val="FF0000"/>
-                </a:solidFill>
-              </a:rPr>
-              <a:t>attacks</a:t>
+              <a:t>1 attacks</a:t>
             </a:r>
             <a:endParaRPr lang="en-US" sz="1400" dirty="0">
               <a:solidFill>
@@ -7586,15 +7594,7 @@
                   <a:srgbClr val="FF0000"/>
                 </a:solidFill>
               </a:rPr>
-              <a:t>2 </a:t>
-            </a:r>
-            <a:r>
-              <a:rPr lang="en-US" sz="1400" dirty="0" smtClean="0">
-                <a:solidFill>
-                  <a:srgbClr val="FF0000"/>
-                </a:solidFill>
-              </a:rPr>
-              <a:t>attacks</a:t>
+              <a:t>2 attacks</a:t>
             </a:r>
             <a:endParaRPr lang="en-US" sz="1400" dirty="0">
               <a:solidFill>
@@ -7677,15 +7677,7 @@
                   <a:srgbClr val="FF0000"/>
                 </a:solidFill>
               </a:rPr>
-              <a:t>3 </a:t>
-            </a:r>
-            <a:r>
-              <a:rPr lang="en-US" sz="1400" dirty="0" smtClean="0">
-                <a:solidFill>
-                  <a:srgbClr val="FF0000"/>
-                </a:solidFill>
-              </a:rPr>
-              <a:t>attacks</a:t>
+              <a:t>3 attacks</a:t>
             </a:r>
             <a:endParaRPr lang="en-US" sz="1400" dirty="0">
               <a:solidFill>
@@ -7768,15 +7760,7 @@
                   <a:srgbClr val="FF0000"/>
                 </a:solidFill>
               </a:rPr>
-              <a:t>4 </a:t>
-            </a:r>
-            <a:r>
-              <a:rPr lang="en-US" sz="1400" dirty="0" smtClean="0">
-                <a:solidFill>
-                  <a:srgbClr val="FF0000"/>
-                </a:solidFill>
-              </a:rPr>
-              <a:t>attacks</a:t>
+              <a:t>4 attacks</a:t>
             </a:r>
             <a:endParaRPr lang="en-US" sz="1400" dirty="0">
               <a:solidFill>
@@ -7859,15 +7843,7 @@
                   <a:srgbClr val="FF0000"/>
                 </a:solidFill>
               </a:rPr>
-              <a:t>5 </a:t>
-            </a:r>
-            <a:r>
-              <a:rPr lang="en-US" sz="1400" dirty="0" smtClean="0">
-                <a:solidFill>
-                  <a:srgbClr val="FF0000"/>
-                </a:solidFill>
-              </a:rPr>
-              <a:t>attacks</a:t>
+              <a:t>5 attacks</a:t>
             </a:r>
             <a:endParaRPr lang="en-US" sz="1400" dirty="0">
               <a:solidFill>
@@ -8200,7 +8176,11 @@
             <a:pPr algn="ctr"/>
             <a:r>
               <a:rPr lang="en-US" sz="1400" dirty="0" smtClean="0"/>
-              <a:t>JavaScript Runtime</a:t>
+              <a:t>Core </a:t>
+            </a:r>
+            <a:r>
+              <a:rPr lang="en-US" sz="1400" dirty="0" smtClean="0"/>
+              <a:t>Runtime</a:t>
             </a:r>
             <a:endParaRPr lang="en-US" sz="1400" dirty="0"/>
           </a:p>
@@ -8248,7 +8228,22 @@
             <a:pPr algn="ctr"/>
             <a:r>
               <a:rPr lang="en-US" sz="1400" dirty="0" smtClean="0"/>
-              <a:t>Core Sandbox</a:t>
+              <a:t>Core</a:t>
+            </a:r>
+          </a:p>
+          <a:p>
+            <a:pPr algn="ctr"/>
+            <a:r>
+              <a:rPr lang="en-US" sz="1400" dirty="0" smtClean="0"/>
+              <a:t>Runtime</a:t>
+            </a:r>
+            <a:r>
+              <a:rPr lang="en-US" sz="1400" dirty="0" smtClean="0"/>
+              <a:t> </a:t>
+            </a:r>
+            <a:r>
+              <a:rPr lang="en-US" sz="1400" dirty="0" smtClean="0"/>
+              <a:t>Sandbox</a:t>
             </a:r>
             <a:endParaRPr lang="en-US" sz="1400" dirty="0"/>
           </a:p>
@@ -8333,9 +8328,10 @@
           <a:p>
             <a:pPr algn="ctr"/>
             <a:r>
-              <a:rPr lang="en-US" sz="1400" dirty="0" smtClean="0"/>
-              <a:t>App</a:t>
-            </a:r>
+              <a:rPr lang="en-US" sz="1400" dirty="0" err="1" smtClean="0"/>
+              <a:t>Hyperty</a:t>
+            </a:r>
+            <a:endParaRPr lang="en-US" sz="1400" dirty="0" smtClean="0"/>
           </a:p>
           <a:p>
             <a:pPr algn="ctr"/>
@@ -8386,7 +8382,6 @@
               <a:rPr lang="en-US" sz="1400" dirty="0" smtClean="0"/>
               <a:t>Service Provider Sandbox</a:t>
             </a:r>
-            <a:endParaRPr lang="en-US" sz="1400" dirty="0" smtClean="0"/>
           </a:p>
         </p:txBody>
       </p:sp>
@@ -8545,7 +8540,7 @@
         </p:nvGraphicFramePr>
         <p:xfrm>
           <a:off x="2127584" y="1397000"/>
-          <a:ext cx="5492415" cy="2372359"/>
+          <a:ext cx="5492415" cy="2372360"/>
         </p:xfrm>
         <a:graphic>
           <a:graphicData uri="http://schemas.openxmlformats.org/drawingml/2006/table">
@@ -10107,7 +10102,11 @@
             <a:pPr algn="ctr"/>
             <a:r>
               <a:rPr lang="en-US" sz="1400" dirty="0" smtClean="0"/>
-              <a:t>JavaScript Runtime</a:t>
+              <a:t>Core </a:t>
+            </a:r>
+            <a:r>
+              <a:rPr lang="en-US" sz="1400" dirty="0" smtClean="0"/>
+              <a:t>Runtime</a:t>
             </a:r>
             <a:endParaRPr lang="en-US" sz="1400" dirty="0"/>
           </a:p>
@@ -10155,7 +10154,22 @@
             <a:pPr algn="ctr"/>
             <a:r>
               <a:rPr lang="en-US" sz="1400" dirty="0" smtClean="0"/>
-              <a:t>Core Sandbox</a:t>
+              <a:t>Core</a:t>
+            </a:r>
+          </a:p>
+          <a:p>
+            <a:pPr algn="ctr"/>
+            <a:r>
+              <a:rPr lang="en-US" sz="1400" dirty="0" smtClean="0"/>
+              <a:t>Runtime</a:t>
+            </a:r>
+            <a:r>
+              <a:rPr lang="en-US" sz="1400" dirty="0" smtClean="0"/>
+              <a:t> </a:t>
+            </a:r>
+            <a:r>
+              <a:rPr lang="en-US" sz="1400" dirty="0" smtClean="0"/>
+              <a:t>Sandbox</a:t>
             </a:r>
             <a:endParaRPr lang="en-US" sz="1400" dirty="0"/>
           </a:p>
@@ -10240,9 +10254,10 @@
           <a:p>
             <a:pPr algn="ctr"/>
             <a:r>
-              <a:rPr lang="en-US" sz="1400" dirty="0" smtClean="0"/>
-              <a:t>App</a:t>
-            </a:r>
+              <a:rPr lang="en-US" sz="1400" dirty="0" err="1" smtClean="0"/>
+              <a:t>Hiperty</a:t>
+            </a:r>
+            <a:endParaRPr lang="en-US" sz="1400" dirty="0" smtClean="0"/>
           </a:p>
           <a:p>
             <a:pPr algn="ctr"/>
@@ -10293,7 +10308,6 @@
               <a:rPr lang="en-US" sz="1400" dirty="0" smtClean="0"/>
               <a:t>Service Provider Sandbox</a:t>
             </a:r>
-            <a:endParaRPr lang="en-US" sz="1400" dirty="0" smtClean="0"/>
           </a:p>
         </p:txBody>
       </p:sp>

</xml_diff>